<commit_message>
Files: organize the files
</commit_message>
<xml_diff>
--- a/2021_ITSC_Gao_Longitudinal Speed Preview/road shape.pptx
+++ b/2021_ITSC_Gao_Longitudinal Speed Preview/road shape.pptx
@@ -5,7 +5,7 @@
     <p:sldMasterId id="2147483648" r:id="rId1"/>
   </p:sldMasterIdLst>
   <p:notesMasterIdLst>
-    <p:notesMasterId r:id="rId8"/>
+    <p:notesMasterId r:id="rId9"/>
   </p:notesMasterIdLst>
   <p:sldIdLst>
     <p:sldId id="413" r:id="rId2"/>
@@ -14,6 +14,7 @@
     <p:sldId id="416" r:id="rId5"/>
     <p:sldId id="417" r:id="rId6"/>
     <p:sldId id="418" r:id="rId7"/>
+    <p:sldId id="419" r:id="rId8"/>
   </p:sldIdLst>
   <p:sldSz cx="12192000" cy="6858000"/>
   <p:notesSz cx="6858000" cy="9144000"/>
@@ -202,7 +203,7 @@
           <a:p>
             <a:fld id="{B4EBBAA9-FCC3-4EC4-8AD4-E05B29FAE6B8}" type="datetimeFigureOut">
               <a:rPr lang="zh-CN" altLang="en-US" smtClean="0"/>
-              <a:t>2021/4/19</a:t>
+              <a:t>2021/4/28</a:t>
             </a:fld>
             <a:endParaRPr lang="zh-CN" altLang="en-US"/>
           </a:p>
@@ -548,7 +549,7 @@
           <a:p>
             <a:fld id="{DABD928F-68B7-E44C-B450-C8CC7A08B0A6}" type="datetime1">
               <a:rPr lang="en-US" smtClean="0"/>
-              <a:t>4/19/2021</a:t>
+              <a:t>4/28/2021</a:t>
             </a:fld>
             <a:endParaRPr lang="en-US"/>
           </a:p>
@@ -687,7 +688,7 @@
           <a:p>
             <a:fld id="{DABD928F-68B7-E44C-B450-C8CC7A08B0A6}" type="datetime1">
               <a:rPr lang="en-US" smtClean="0"/>
-              <a:t>4/19/2021</a:t>
+              <a:t>4/28/2021</a:t>
             </a:fld>
             <a:endParaRPr lang="en-US"/>
           </a:p>
@@ -826,7 +827,7 @@
           <a:p>
             <a:fld id="{DABD928F-68B7-E44C-B450-C8CC7A08B0A6}" type="datetime1">
               <a:rPr lang="en-US" smtClean="0"/>
-              <a:t>4/19/2021</a:t>
+              <a:t>4/28/2021</a:t>
             </a:fld>
             <a:endParaRPr lang="en-US"/>
           </a:p>
@@ -965,7 +966,7 @@
           <a:p>
             <a:fld id="{DABD928F-68B7-E44C-B450-C8CC7A08B0A6}" type="datetime1">
               <a:rPr lang="en-US" smtClean="0"/>
-              <a:t>4/20/2021</a:t>
+              <a:t>4/28/2021</a:t>
             </a:fld>
             <a:endParaRPr lang="en-US"/>
           </a:p>
@@ -1104,7 +1105,7 @@
           <a:p>
             <a:fld id="{DABD928F-68B7-E44C-B450-C8CC7A08B0A6}" type="datetime1">
               <a:rPr lang="en-US" smtClean="0"/>
-              <a:t>4/20/2021</a:t>
+              <a:t>4/28/2021</a:t>
             </a:fld>
             <a:endParaRPr lang="en-US"/>
           </a:p>
@@ -1243,7 +1244,7 @@
           <a:p>
             <a:fld id="{DABD928F-68B7-E44C-B450-C8CC7A08B0A6}" type="datetime1">
               <a:rPr lang="en-US" smtClean="0"/>
-              <a:t>4/20/2021</a:t>
+              <a:t>4/28/2021</a:t>
             </a:fld>
             <a:endParaRPr lang="en-US"/>
           </a:p>
@@ -1295,6 +1296,145 @@
     <p:extLst>
       <p:ext uri="{BB962C8B-B14F-4D97-AF65-F5344CB8AC3E}">
         <p14:creationId xmlns:p14="http://schemas.microsoft.com/office/powerpoint/2010/main" val="3190349334"/>
+      </p:ext>
+    </p:extLst>
+  </p:cSld>
+  <p:clrMapOvr>
+    <a:masterClrMapping/>
+  </p:clrMapOvr>
+</p:notes>
+</file>
+
+<file path=ppt/notesSlides/notesSlide7.xml><?xml version="1.0" encoding="utf-8"?>
+<p:notes xmlns:a="http://schemas.openxmlformats.org/drawingml/2006/main" xmlns:r="http://schemas.openxmlformats.org/officeDocument/2006/relationships" xmlns:p="http://schemas.openxmlformats.org/presentationml/2006/main">
+  <p:cSld>
+    <p:spTree>
+      <p:nvGrpSpPr>
+        <p:cNvPr id="1" name=""/>
+        <p:cNvGrpSpPr/>
+        <p:nvPr/>
+      </p:nvGrpSpPr>
+      <p:grpSpPr>
+        <a:xfrm>
+          <a:off x="0" y="0"/>
+          <a:ext cx="0" cy="0"/>
+          <a:chOff x="0" y="0"/>
+          <a:chExt cx="0" cy="0"/>
+        </a:xfrm>
+      </p:grpSpPr>
+      <p:sp>
+        <p:nvSpPr>
+          <p:cNvPr id="2" name="Slide Image Placeholder 1"/>
+          <p:cNvSpPr>
+            <a:spLocks noGrp="1" noRot="1" noChangeAspect="1"/>
+          </p:cNvSpPr>
+          <p:nvPr>
+            <p:ph type="sldImg"/>
+          </p:nvPr>
+        </p:nvSpPr>
+        <p:spPr>
+          <a:xfrm>
+            <a:off x="381000" y="685800"/>
+            <a:ext cx="6096000" cy="3429000"/>
+          </a:xfrm>
+        </p:spPr>
+      </p:sp>
+      <p:sp>
+        <p:nvSpPr>
+          <p:cNvPr id="3" name="Notes Placeholder 2"/>
+          <p:cNvSpPr>
+            <a:spLocks noGrp="1"/>
+          </p:cNvSpPr>
+          <p:nvPr>
+            <p:ph type="body" idx="1"/>
+          </p:nvPr>
+        </p:nvSpPr>
+        <p:spPr/>
+        <p:txBody>
+          <a:bodyPr/>
+          <a:lstStyle/>
+          <a:p>
+            <a:endParaRPr lang="en-US" sz="1200" kern="1200" dirty="0">
+              <a:solidFill>
+                <a:schemeClr val="tx1"/>
+              </a:solidFill>
+              <a:effectLst/>
+              <a:latin typeface="+mn-lt"/>
+              <a:ea typeface="+mn-ea"/>
+              <a:cs typeface="+mn-cs"/>
+            </a:endParaRPr>
+          </a:p>
+        </p:txBody>
+      </p:sp>
+      <p:sp>
+        <p:nvSpPr>
+          <p:cNvPr id="4" name="Date Placeholder 3"/>
+          <p:cNvSpPr>
+            <a:spLocks noGrp="1"/>
+          </p:cNvSpPr>
+          <p:nvPr>
+            <p:ph type="dt" idx="10"/>
+          </p:nvPr>
+        </p:nvSpPr>
+        <p:spPr/>
+        <p:txBody>
+          <a:bodyPr/>
+          <a:lstStyle/>
+          <a:p>
+            <a:fld id="{DABD928F-68B7-E44C-B450-C8CC7A08B0A6}" type="datetime1">
+              <a:rPr lang="en-US" smtClean="0"/>
+              <a:t>4/28/2021</a:t>
+            </a:fld>
+            <a:endParaRPr lang="en-US"/>
+          </a:p>
+        </p:txBody>
+      </p:sp>
+      <p:sp>
+        <p:nvSpPr>
+          <p:cNvPr id="5" name="Footer Placeholder 4"/>
+          <p:cNvSpPr>
+            <a:spLocks noGrp="1"/>
+          </p:cNvSpPr>
+          <p:nvPr>
+            <p:ph type="ftr" sz="quarter" idx="11"/>
+          </p:nvPr>
+        </p:nvSpPr>
+        <p:spPr/>
+        <p:txBody>
+          <a:bodyPr/>
+          <a:lstStyle/>
+          <a:p>
+            <a:endParaRPr lang="en-US"/>
+          </a:p>
+        </p:txBody>
+      </p:sp>
+      <p:sp>
+        <p:nvSpPr>
+          <p:cNvPr id="6" name="Slide Number Placeholder 5"/>
+          <p:cNvSpPr>
+            <a:spLocks noGrp="1"/>
+          </p:cNvSpPr>
+          <p:nvPr>
+            <p:ph type="sldNum" sz="quarter" idx="12"/>
+          </p:nvPr>
+        </p:nvSpPr>
+        <p:spPr/>
+        <p:txBody>
+          <a:bodyPr/>
+          <a:lstStyle/>
+          <a:p>
+            <a:fld id="{81E4D81A-3A66-3246-B252-65A0947B0B19}" type="slidenum">
+              <a:rPr lang="en-US" smtClean="0"/>
+              <a:t>7</a:t>
+            </a:fld>
+            <a:endParaRPr lang="en-US"/>
+          </a:p>
+        </p:txBody>
+      </p:sp>
+    </p:spTree>
+    <p:extLst>
+      <p:ext uri="{BB962C8B-B14F-4D97-AF65-F5344CB8AC3E}">
+        <p14:creationId xmlns:p14="http://schemas.microsoft.com/office/powerpoint/2010/main" val="694294656"/>
       </p:ext>
     </p:extLst>
   </p:cSld>
@@ -1453,7 +1593,7 @@
           <a:p>
             <a:fld id="{327B5FAD-3124-4983-9A28-ED93A956665B}" type="datetimeFigureOut">
               <a:rPr lang="zh-CN" altLang="en-US" smtClean="0"/>
-              <a:t>2021/4/19</a:t>
+              <a:t>2021/4/28</a:t>
             </a:fld>
             <a:endParaRPr lang="zh-CN" altLang="en-US"/>
           </a:p>
@@ -1653,7 +1793,7 @@
           <a:p>
             <a:fld id="{327B5FAD-3124-4983-9A28-ED93A956665B}" type="datetimeFigureOut">
               <a:rPr lang="zh-CN" altLang="en-US" smtClean="0"/>
-              <a:t>2021/4/19</a:t>
+              <a:t>2021/4/28</a:t>
             </a:fld>
             <a:endParaRPr lang="zh-CN" altLang="en-US"/>
           </a:p>
@@ -1863,7 +2003,7 @@
           <a:p>
             <a:fld id="{327B5FAD-3124-4983-9A28-ED93A956665B}" type="datetimeFigureOut">
               <a:rPr lang="zh-CN" altLang="en-US" smtClean="0"/>
-              <a:t>2021/4/19</a:t>
+              <a:t>2021/4/28</a:t>
             </a:fld>
             <a:endParaRPr lang="zh-CN" altLang="en-US"/>
           </a:p>
@@ -2063,7 +2203,7 @@
           <a:p>
             <a:fld id="{327B5FAD-3124-4983-9A28-ED93A956665B}" type="datetimeFigureOut">
               <a:rPr lang="zh-CN" altLang="en-US" smtClean="0"/>
-              <a:t>2021/4/19</a:t>
+              <a:t>2021/4/28</a:t>
             </a:fld>
             <a:endParaRPr lang="zh-CN" altLang="en-US"/>
           </a:p>
@@ -2339,7 +2479,7 @@
           <a:p>
             <a:fld id="{327B5FAD-3124-4983-9A28-ED93A956665B}" type="datetimeFigureOut">
               <a:rPr lang="zh-CN" altLang="en-US" smtClean="0"/>
-              <a:t>2021/4/19</a:t>
+              <a:t>2021/4/28</a:t>
             </a:fld>
             <a:endParaRPr lang="zh-CN" altLang="en-US"/>
           </a:p>
@@ -2607,7 +2747,7 @@
           <a:p>
             <a:fld id="{327B5FAD-3124-4983-9A28-ED93A956665B}" type="datetimeFigureOut">
               <a:rPr lang="zh-CN" altLang="en-US" smtClean="0"/>
-              <a:t>2021/4/19</a:t>
+              <a:t>2021/4/28</a:t>
             </a:fld>
             <a:endParaRPr lang="zh-CN" altLang="en-US"/>
           </a:p>
@@ -3022,7 +3162,7 @@
           <a:p>
             <a:fld id="{327B5FAD-3124-4983-9A28-ED93A956665B}" type="datetimeFigureOut">
               <a:rPr lang="zh-CN" altLang="en-US" smtClean="0"/>
-              <a:t>2021/4/19</a:t>
+              <a:t>2021/4/28</a:t>
             </a:fld>
             <a:endParaRPr lang="zh-CN" altLang="en-US"/>
           </a:p>
@@ -3164,7 +3304,7 @@
           <a:p>
             <a:fld id="{327B5FAD-3124-4983-9A28-ED93A956665B}" type="datetimeFigureOut">
               <a:rPr lang="zh-CN" altLang="en-US" smtClean="0"/>
-              <a:t>2021/4/19</a:t>
+              <a:t>2021/4/28</a:t>
             </a:fld>
             <a:endParaRPr lang="zh-CN" altLang="en-US"/>
           </a:p>
@@ -3277,7 +3417,7 @@
           <a:p>
             <a:fld id="{327B5FAD-3124-4983-9A28-ED93A956665B}" type="datetimeFigureOut">
               <a:rPr lang="zh-CN" altLang="en-US" smtClean="0"/>
-              <a:t>2021/4/19</a:t>
+              <a:t>2021/4/28</a:t>
             </a:fld>
             <a:endParaRPr lang="zh-CN" altLang="en-US"/>
           </a:p>
@@ -3590,7 +3730,7 @@
           <a:p>
             <a:fld id="{327B5FAD-3124-4983-9A28-ED93A956665B}" type="datetimeFigureOut">
               <a:rPr lang="zh-CN" altLang="en-US" smtClean="0"/>
-              <a:t>2021/4/19</a:t>
+              <a:t>2021/4/28</a:t>
             </a:fld>
             <a:endParaRPr lang="zh-CN" altLang="en-US"/>
           </a:p>
@@ -3879,7 +4019,7 @@
           <a:p>
             <a:fld id="{327B5FAD-3124-4983-9A28-ED93A956665B}" type="datetimeFigureOut">
               <a:rPr lang="zh-CN" altLang="en-US" smtClean="0"/>
-              <a:t>2021/4/19</a:t>
+              <a:t>2021/4/28</a:t>
             </a:fld>
             <a:endParaRPr lang="zh-CN" altLang="en-US"/>
           </a:p>
@@ -4122,7 +4262,7 @@
           <a:p>
             <a:fld id="{327B5FAD-3124-4983-9A28-ED93A956665B}" type="datetimeFigureOut">
               <a:rPr lang="zh-CN" altLang="en-US" smtClean="0"/>
-              <a:t>2021/4/19</a:t>
+              <a:t>2021/4/28</a:t>
             </a:fld>
             <a:endParaRPr lang="zh-CN" altLang="en-US"/>
           </a:p>
@@ -6979,6 +7119,1064 @@
     <p:extLst>
       <p:ext uri="{BB962C8B-B14F-4D97-AF65-F5344CB8AC3E}">
         <p14:creationId xmlns:p14="http://schemas.microsoft.com/office/powerpoint/2010/main" val="3506028176"/>
+      </p:ext>
+    </p:extLst>
+  </p:cSld>
+  <p:clrMapOvr>
+    <a:masterClrMapping/>
+  </p:clrMapOvr>
+</p:sld>
+</file>
+
+<file path=ppt/slides/slide7.xml><?xml version="1.0" encoding="utf-8"?>
+<p:sld xmlns:a="http://schemas.openxmlformats.org/drawingml/2006/main" xmlns:r="http://schemas.openxmlformats.org/officeDocument/2006/relationships" xmlns:p="http://schemas.openxmlformats.org/presentationml/2006/main">
+  <p:cSld>
+    <p:spTree>
+      <p:nvGrpSpPr>
+        <p:cNvPr id="1" name=""/>
+        <p:cNvGrpSpPr/>
+        <p:nvPr/>
+      </p:nvGrpSpPr>
+      <p:grpSpPr>
+        <a:xfrm>
+          <a:off x="0" y="0"/>
+          <a:ext cx="0" cy="0"/>
+          <a:chOff x="0" y="0"/>
+          <a:chExt cx="0" cy="0"/>
+        </a:xfrm>
+      </p:grpSpPr>
+      <p:sp>
+        <p:nvSpPr>
+          <p:cNvPr id="6" name="Slide Number Placeholder 5"/>
+          <p:cNvSpPr>
+            <a:spLocks noGrp="1"/>
+          </p:cNvSpPr>
+          <p:nvPr>
+            <p:ph type="sldNum" sz="quarter" idx="12"/>
+          </p:nvPr>
+        </p:nvSpPr>
+        <p:spPr/>
+        <p:txBody>
+          <a:bodyPr/>
+          <a:lstStyle/>
+          <a:p>
+            <a:fld id="{9C83FA52-DE9E-F74B-8D92-F52C18C07DAA}" type="slidenum">
+              <a:rPr lang="en-US" smtClean="0"/>
+              <a:t>7</a:t>
+            </a:fld>
+            <a:endParaRPr lang="en-US"/>
+          </a:p>
+        </p:txBody>
+      </p:sp>
+      <p:grpSp>
+        <p:nvGrpSpPr>
+          <p:cNvPr id="19" name="Group 18">
+            <a:extLst>
+              <a:ext uri="{FF2B5EF4-FFF2-40B4-BE49-F238E27FC236}">
+                <a16:creationId xmlns:a16="http://schemas.microsoft.com/office/drawing/2014/main" id="{39AC69B4-E11B-4109-9A2E-0AD170232C63}"/>
+              </a:ext>
+            </a:extLst>
+          </p:cNvPr>
+          <p:cNvGrpSpPr/>
+          <p:nvPr/>
+        </p:nvGrpSpPr>
+        <p:grpSpPr>
+          <a:xfrm>
+            <a:off x="545401" y="1825621"/>
+            <a:ext cx="11318388" cy="1850267"/>
+            <a:chOff x="170497" y="1816477"/>
+            <a:chExt cx="11318388" cy="2935605"/>
+          </a:xfrm>
+        </p:grpSpPr>
+        <p:pic>
+          <p:nvPicPr>
+            <p:cNvPr id="10" name="Graphic 9">
+              <a:extLst>
+                <a:ext uri="{FF2B5EF4-FFF2-40B4-BE49-F238E27FC236}">
+                  <a16:creationId xmlns:a16="http://schemas.microsoft.com/office/drawing/2014/main" id="{0578F22D-728C-4925-BCD9-D22C3A598988}"/>
+                </a:ext>
+              </a:extLst>
+            </p:cNvPr>
+            <p:cNvPicPr>
+              <a:picLocks noChangeAspect="1"/>
+            </p:cNvPicPr>
+            <p:nvPr/>
+          </p:nvPicPr>
+          <p:blipFill>
+            <a:blip r:embed="rId3">
+              <a:extLst>
+                <a:ext uri="{96DAC541-7B7A-43D3-8B79-37D633B846F1}">
+                  <asvg:svgBlip xmlns:asvg="http://schemas.microsoft.com/office/drawing/2016/SVG/main" r:embed="rId4"/>
+                </a:ext>
+              </a:extLst>
+            </a:blip>
+            <a:stretch>
+              <a:fillRect/>
+            </a:stretch>
+          </p:blipFill>
+          <p:spPr>
+            <a:xfrm>
+              <a:off x="170497" y="1816477"/>
+              <a:ext cx="11318388" cy="2935605"/>
+            </a:xfrm>
+            <a:prstGeom prst="rect">
+              <a:avLst/>
+            </a:prstGeom>
+          </p:spPr>
+        </p:pic>
+        <p:sp>
+          <p:nvSpPr>
+            <p:cNvPr id="11" name="Parallelogram 10">
+              <a:extLst>
+                <a:ext uri="{FF2B5EF4-FFF2-40B4-BE49-F238E27FC236}">
+                  <a16:creationId xmlns:a16="http://schemas.microsoft.com/office/drawing/2014/main" id="{131145FE-0E41-4053-BBE8-8F24002734E0}"/>
+                </a:ext>
+              </a:extLst>
+            </p:cNvPr>
+            <p:cNvSpPr/>
+            <p:nvPr/>
+          </p:nvSpPr>
+          <p:spPr>
+            <a:xfrm>
+              <a:off x="4597053" y="2026085"/>
+              <a:ext cx="6666127" cy="1583889"/>
+            </a:xfrm>
+            <a:prstGeom prst="parallelogram">
+              <a:avLst>
+                <a:gd name="adj" fmla="val 188482"/>
+              </a:avLst>
+            </a:prstGeom>
+            <a:solidFill>
+              <a:srgbClr val="1BA1E2">
+                <a:alpha val="70000"/>
+              </a:srgbClr>
+            </a:solidFill>
+            <a:ln>
+              <a:noFill/>
+            </a:ln>
+          </p:spPr>
+          <p:style>
+            <a:lnRef idx="2">
+              <a:schemeClr val="accent1">
+                <a:shade val="50000"/>
+              </a:schemeClr>
+            </a:lnRef>
+            <a:fillRef idx="1">
+              <a:schemeClr val="accent1"/>
+            </a:fillRef>
+            <a:effectRef idx="0">
+              <a:schemeClr val="accent1"/>
+            </a:effectRef>
+            <a:fontRef idx="minor">
+              <a:schemeClr val="lt1"/>
+            </a:fontRef>
+          </p:style>
+          <p:txBody>
+            <a:bodyPr rtlCol="0" anchor="ctr"/>
+            <a:lstStyle/>
+            <a:p>
+              <a:pPr algn="ctr"/>
+              <a:endParaRPr lang="zh-CN" altLang="en-US"/>
+            </a:p>
+          </p:txBody>
+        </p:sp>
+        <p:sp>
+          <p:nvSpPr>
+            <p:cNvPr id="16" name="Freeform: Shape 15">
+              <a:extLst>
+                <a:ext uri="{FF2B5EF4-FFF2-40B4-BE49-F238E27FC236}">
+                  <a16:creationId xmlns:a16="http://schemas.microsoft.com/office/drawing/2014/main" id="{763E1A57-3AB9-464E-BF6B-687ABAE2E15F}"/>
+                </a:ext>
+              </a:extLst>
+            </p:cNvPr>
+            <p:cNvSpPr/>
+            <p:nvPr/>
+          </p:nvSpPr>
+          <p:spPr>
+            <a:xfrm>
+              <a:off x="6129338" y="3595685"/>
+              <a:ext cx="2147887" cy="707233"/>
+            </a:xfrm>
+            <a:custGeom>
+              <a:avLst/>
+              <a:gdLst>
+                <a:gd name="connsiteX0" fmla="*/ 114300 w 2147887"/>
+                <a:gd name="connsiteY0" fmla="*/ 4763 h 685800"/>
+                <a:gd name="connsiteX1" fmla="*/ 1924050 w 2147887"/>
+                <a:gd name="connsiteY1" fmla="*/ 14288 h 685800"/>
+                <a:gd name="connsiteX2" fmla="*/ 1981200 w 2147887"/>
+                <a:gd name="connsiteY2" fmla="*/ 9525 h 685800"/>
+                <a:gd name="connsiteX3" fmla="*/ 2071687 w 2147887"/>
+                <a:gd name="connsiteY3" fmla="*/ 214313 h 685800"/>
+                <a:gd name="connsiteX4" fmla="*/ 2114550 w 2147887"/>
+                <a:gd name="connsiteY4" fmla="*/ 300038 h 685800"/>
+                <a:gd name="connsiteX5" fmla="*/ 2133600 w 2147887"/>
+                <a:gd name="connsiteY5" fmla="*/ 428625 h 685800"/>
+                <a:gd name="connsiteX6" fmla="*/ 2147887 w 2147887"/>
+                <a:gd name="connsiteY6" fmla="*/ 552450 h 685800"/>
+                <a:gd name="connsiteX7" fmla="*/ 2147887 w 2147887"/>
+                <a:gd name="connsiteY7" fmla="*/ 685800 h 685800"/>
+                <a:gd name="connsiteX8" fmla="*/ 852487 w 2147887"/>
+                <a:gd name="connsiteY8" fmla="*/ 676275 h 685800"/>
+                <a:gd name="connsiteX9" fmla="*/ 623887 w 2147887"/>
+                <a:gd name="connsiteY9" fmla="*/ 357188 h 685800"/>
+                <a:gd name="connsiteX10" fmla="*/ 519112 w 2147887"/>
+                <a:gd name="connsiteY10" fmla="*/ 280988 h 685800"/>
+                <a:gd name="connsiteX11" fmla="*/ 404812 w 2147887"/>
+                <a:gd name="connsiteY11" fmla="*/ 195263 h 685800"/>
+                <a:gd name="connsiteX12" fmla="*/ 271462 w 2147887"/>
+                <a:gd name="connsiteY12" fmla="*/ 138113 h 685800"/>
+                <a:gd name="connsiteX13" fmla="*/ 100012 w 2147887"/>
+                <a:gd name="connsiteY13" fmla="*/ 61913 h 685800"/>
+                <a:gd name="connsiteX14" fmla="*/ 28575 w 2147887"/>
+                <a:gd name="connsiteY14" fmla="*/ 28575 h 685800"/>
+                <a:gd name="connsiteX15" fmla="*/ 0 w 2147887"/>
+                <a:gd name="connsiteY15" fmla="*/ 0 h 685800"/>
+                <a:gd name="connsiteX16" fmla="*/ 114300 w 2147887"/>
+                <a:gd name="connsiteY16" fmla="*/ 4763 h 685800"/>
+              </a:gdLst>
+              <a:ahLst/>
+              <a:cxnLst>
+                <a:cxn ang="0">
+                  <a:pos x="connsiteX0" y="connsiteY0"/>
+                </a:cxn>
+                <a:cxn ang="0">
+                  <a:pos x="connsiteX1" y="connsiteY1"/>
+                </a:cxn>
+                <a:cxn ang="0">
+                  <a:pos x="connsiteX2" y="connsiteY2"/>
+                </a:cxn>
+                <a:cxn ang="0">
+                  <a:pos x="connsiteX3" y="connsiteY3"/>
+                </a:cxn>
+                <a:cxn ang="0">
+                  <a:pos x="connsiteX4" y="connsiteY4"/>
+                </a:cxn>
+                <a:cxn ang="0">
+                  <a:pos x="connsiteX5" y="connsiteY5"/>
+                </a:cxn>
+                <a:cxn ang="0">
+                  <a:pos x="connsiteX6" y="connsiteY6"/>
+                </a:cxn>
+                <a:cxn ang="0">
+                  <a:pos x="connsiteX7" y="connsiteY7"/>
+                </a:cxn>
+                <a:cxn ang="0">
+                  <a:pos x="connsiteX8" y="connsiteY8"/>
+                </a:cxn>
+                <a:cxn ang="0">
+                  <a:pos x="connsiteX9" y="connsiteY9"/>
+                </a:cxn>
+                <a:cxn ang="0">
+                  <a:pos x="connsiteX10" y="connsiteY10"/>
+                </a:cxn>
+                <a:cxn ang="0">
+                  <a:pos x="connsiteX11" y="connsiteY11"/>
+                </a:cxn>
+                <a:cxn ang="0">
+                  <a:pos x="connsiteX12" y="connsiteY12"/>
+                </a:cxn>
+                <a:cxn ang="0">
+                  <a:pos x="connsiteX13" y="connsiteY13"/>
+                </a:cxn>
+                <a:cxn ang="0">
+                  <a:pos x="connsiteX14" y="connsiteY14"/>
+                </a:cxn>
+                <a:cxn ang="0">
+                  <a:pos x="connsiteX15" y="connsiteY15"/>
+                </a:cxn>
+                <a:cxn ang="0">
+                  <a:pos x="connsiteX16" y="connsiteY16"/>
+                </a:cxn>
+              </a:cxnLst>
+              <a:rect l="l" t="t" r="r" b="b"/>
+              <a:pathLst>
+                <a:path w="2147887" h="685800">
+                  <a:moveTo>
+                    <a:pt x="114300" y="4763"/>
+                  </a:moveTo>
+                  <a:lnTo>
+                    <a:pt x="1924050" y="14288"/>
+                  </a:lnTo>
+                  <a:lnTo>
+                    <a:pt x="1981200" y="9525"/>
+                  </a:lnTo>
+                  <a:lnTo>
+                    <a:pt x="2071687" y="214313"/>
+                  </a:lnTo>
+                  <a:lnTo>
+                    <a:pt x="2114550" y="300038"/>
+                  </a:lnTo>
+                  <a:lnTo>
+                    <a:pt x="2133600" y="428625"/>
+                  </a:lnTo>
+                  <a:lnTo>
+                    <a:pt x="2147887" y="552450"/>
+                  </a:lnTo>
+                  <a:lnTo>
+                    <a:pt x="2147887" y="685800"/>
+                  </a:lnTo>
+                  <a:lnTo>
+                    <a:pt x="852487" y="676275"/>
+                  </a:lnTo>
+                  <a:lnTo>
+                    <a:pt x="623887" y="357188"/>
+                  </a:lnTo>
+                  <a:lnTo>
+                    <a:pt x="519112" y="280988"/>
+                  </a:lnTo>
+                  <a:lnTo>
+                    <a:pt x="404812" y="195263"/>
+                  </a:lnTo>
+                  <a:lnTo>
+                    <a:pt x="271462" y="138113"/>
+                  </a:lnTo>
+                  <a:lnTo>
+                    <a:pt x="100012" y="61913"/>
+                  </a:lnTo>
+                  <a:lnTo>
+                    <a:pt x="28575" y="28575"/>
+                  </a:lnTo>
+                  <a:lnTo>
+                    <a:pt x="0" y="0"/>
+                  </a:lnTo>
+                  <a:lnTo>
+                    <a:pt x="114300" y="4763"/>
+                  </a:lnTo>
+                  <a:close/>
+                </a:path>
+              </a:pathLst>
+            </a:custGeom>
+            <a:solidFill>
+              <a:srgbClr val="1BA1E2">
+                <a:alpha val="69804"/>
+              </a:srgbClr>
+            </a:solidFill>
+            <a:ln>
+              <a:noFill/>
+            </a:ln>
+          </p:spPr>
+          <p:style>
+            <a:lnRef idx="2">
+              <a:schemeClr val="accent1">
+                <a:shade val="50000"/>
+              </a:schemeClr>
+            </a:lnRef>
+            <a:fillRef idx="1">
+              <a:schemeClr val="accent1"/>
+            </a:fillRef>
+            <a:effectRef idx="0">
+              <a:schemeClr val="accent1"/>
+            </a:effectRef>
+            <a:fontRef idx="minor">
+              <a:schemeClr val="lt1"/>
+            </a:fontRef>
+          </p:style>
+          <p:txBody>
+            <a:bodyPr rtlCol="0" anchor="ctr"/>
+            <a:lstStyle/>
+            <a:p>
+              <a:pPr algn="ctr"/>
+              <a:endParaRPr lang="zh-CN" altLang="en-US"/>
+            </a:p>
+          </p:txBody>
+        </p:sp>
+      </p:grpSp>
+      <p:pic>
+        <p:nvPicPr>
+          <p:cNvPr id="3" name="Graphic 2" descr="Database">
+            <a:extLst>
+              <a:ext uri="{FF2B5EF4-FFF2-40B4-BE49-F238E27FC236}">
+                <a16:creationId xmlns:a16="http://schemas.microsoft.com/office/drawing/2014/main" id="{A1F806B4-8050-4514-B0F9-91E4C8AF81C6}"/>
+              </a:ext>
+            </a:extLst>
+          </p:cNvPr>
+          <p:cNvPicPr>
+            <a:picLocks noChangeAspect="1"/>
+          </p:cNvPicPr>
+          <p:nvPr/>
+        </p:nvPicPr>
+        <p:blipFill>
+          <a:blip r:embed="rId5">
+            <a:extLst>
+              <a:ext uri="{28A0092B-C50C-407E-A947-70E740481C1C}">
+                <a14:useLocalDpi xmlns:a14="http://schemas.microsoft.com/office/drawing/2010/main" val="0"/>
+              </a:ext>
+              <a:ext uri="{96DAC541-7B7A-43D3-8B79-37D633B846F1}">
+                <asvg:svgBlip xmlns:asvg="http://schemas.microsoft.com/office/drawing/2016/SVG/main" r:embed="rId6"/>
+              </a:ext>
+            </a:extLst>
+          </a:blip>
+          <a:stretch>
+            <a:fillRect/>
+          </a:stretch>
+        </p:blipFill>
+        <p:spPr>
+          <a:xfrm>
+            <a:off x="2584704" y="3973703"/>
+            <a:ext cx="1329817" cy="927481"/>
+          </a:xfrm>
+          <a:prstGeom prst="rect">
+            <a:avLst/>
+          </a:prstGeom>
+        </p:spPr>
+      </p:pic>
+      <p:sp>
+        <p:nvSpPr>
+          <p:cNvPr id="4" name="Rectangle 3">
+            <a:extLst>
+              <a:ext uri="{FF2B5EF4-FFF2-40B4-BE49-F238E27FC236}">
+                <a16:creationId xmlns:a16="http://schemas.microsoft.com/office/drawing/2014/main" id="{51F26A66-9915-4286-98C5-884FE20BBD68}"/>
+              </a:ext>
+            </a:extLst>
+          </p:cNvPr>
+          <p:cNvSpPr/>
+          <p:nvPr/>
+        </p:nvSpPr>
+        <p:spPr>
+          <a:xfrm>
+            <a:off x="553916" y="2539180"/>
+            <a:ext cx="1361829" cy="998301"/>
+          </a:xfrm>
+          <a:prstGeom prst="rect">
+            <a:avLst/>
+          </a:prstGeom>
+          <a:solidFill>
+            <a:srgbClr val="FFFFFF"/>
+          </a:solidFill>
+          <a:ln>
+            <a:noFill/>
+          </a:ln>
+        </p:spPr>
+        <p:style>
+          <a:lnRef idx="2">
+            <a:schemeClr val="accent1">
+              <a:shade val="50000"/>
+            </a:schemeClr>
+          </a:lnRef>
+          <a:fillRef idx="1">
+            <a:schemeClr val="accent1"/>
+          </a:fillRef>
+          <a:effectRef idx="0">
+            <a:schemeClr val="accent1"/>
+          </a:effectRef>
+          <a:fontRef idx="minor">
+            <a:schemeClr val="lt1"/>
+          </a:fontRef>
+        </p:style>
+        <p:txBody>
+          <a:bodyPr rtlCol="0" anchor="ctr"/>
+          <a:lstStyle/>
+          <a:p>
+            <a:pPr algn="ctr"/>
+            <a:endParaRPr lang="zh-CN" altLang="en-US"/>
+          </a:p>
+        </p:txBody>
+      </p:sp>
+      <p:sp>
+        <p:nvSpPr>
+          <p:cNvPr id="12" name="Rectangle 11">
+            <a:extLst>
+              <a:ext uri="{FF2B5EF4-FFF2-40B4-BE49-F238E27FC236}">
+                <a16:creationId xmlns:a16="http://schemas.microsoft.com/office/drawing/2014/main" id="{93D488B0-1274-459C-AE73-82D4AC728348}"/>
+              </a:ext>
+            </a:extLst>
+          </p:cNvPr>
+          <p:cNvSpPr/>
+          <p:nvPr/>
+        </p:nvSpPr>
+        <p:spPr>
+          <a:xfrm>
+            <a:off x="10443333" y="1638455"/>
+            <a:ext cx="1318966" cy="998301"/>
+          </a:xfrm>
+          <a:prstGeom prst="rect">
+            <a:avLst/>
+          </a:prstGeom>
+          <a:solidFill>
+            <a:srgbClr val="FFFFFF"/>
+          </a:solidFill>
+          <a:ln>
+            <a:noFill/>
+          </a:ln>
+        </p:spPr>
+        <p:style>
+          <a:lnRef idx="2">
+            <a:schemeClr val="accent1">
+              <a:shade val="50000"/>
+            </a:schemeClr>
+          </a:lnRef>
+          <a:fillRef idx="1">
+            <a:schemeClr val="accent1"/>
+          </a:fillRef>
+          <a:effectRef idx="0">
+            <a:schemeClr val="accent1"/>
+          </a:effectRef>
+          <a:fontRef idx="minor">
+            <a:schemeClr val="lt1"/>
+          </a:fontRef>
+        </p:style>
+        <p:txBody>
+          <a:bodyPr rtlCol="0" anchor="ctr"/>
+          <a:lstStyle/>
+          <a:p>
+            <a:pPr algn="ctr"/>
+            <a:endParaRPr lang="zh-CN" altLang="en-US"/>
+          </a:p>
+        </p:txBody>
+      </p:sp>
+      <p:cxnSp>
+        <p:nvCxnSpPr>
+          <p:cNvPr id="7" name="Straight Connector 6">
+            <a:extLst>
+              <a:ext uri="{FF2B5EF4-FFF2-40B4-BE49-F238E27FC236}">
+                <a16:creationId xmlns:a16="http://schemas.microsoft.com/office/drawing/2014/main" id="{1CE9C14A-BE1B-499F-8CED-94A998FEB8DC}"/>
+              </a:ext>
+            </a:extLst>
+          </p:cNvPr>
+          <p:cNvCxnSpPr/>
+          <p:nvPr/>
+        </p:nvCxnSpPr>
+        <p:spPr>
+          <a:xfrm>
+            <a:off x="1915745" y="2636756"/>
+            <a:ext cx="0" cy="758952"/>
+          </a:xfrm>
+          <a:prstGeom prst="line">
+            <a:avLst/>
+          </a:prstGeom>
+          <a:ln w="28575">
+            <a:solidFill>
+              <a:schemeClr val="tx1">
+                <a:lumMod val="95000"/>
+                <a:lumOff val="5000"/>
+              </a:schemeClr>
+            </a:solidFill>
+          </a:ln>
+        </p:spPr>
+        <p:style>
+          <a:lnRef idx="1">
+            <a:schemeClr val="accent1"/>
+          </a:lnRef>
+          <a:fillRef idx="0">
+            <a:schemeClr val="accent1"/>
+          </a:fillRef>
+          <a:effectRef idx="0">
+            <a:schemeClr val="accent1"/>
+          </a:effectRef>
+          <a:fontRef idx="minor">
+            <a:schemeClr val="tx1"/>
+          </a:fontRef>
+        </p:style>
+      </p:cxnSp>
+      <p:cxnSp>
+        <p:nvCxnSpPr>
+          <p:cNvPr id="13" name="Straight Connector 12">
+            <a:extLst>
+              <a:ext uri="{FF2B5EF4-FFF2-40B4-BE49-F238E27FC236}">
+                <a16:creationId xmlns:a16="http://schemas.microsoft.com/office/drawing/2014/main" id="{B85D6D86-B93D-4822-8724-5150A7005638}"/>
+              </a:ext>
+            </a:extLst>
+          </p:cNvPr>
+          <p:cNvCxnSpPr/>
+          <p:nvPr/>
+        </p:nvCxnSpPr>
+        <p:spPr>
+          <a:xfrm>
+            <a:off x="10440218" y="1839594"/>
+            <a:ext cx="0" cy="758952"/>
+          </a:xfrm>
+          <a:prstGeom prst="line">
+            <a:avLst/>
+          </a:prstGeom>
+          <a:ln w="28575">
+            <a:solidFill>
+              <a:schemeClr val="tx1">
+                <a:lumMod val="95000"/>
+                <a:lumOff val="5000"/>
+              </a:schemeClr>
+            </a:solidFill>
+          </a:ln>
+        </p:spPr>
+        <p:style>
+          <a:lnRef idx="1">
+            <a:schemeClr val="accent1"/>
+          </a:lnRef>
+          <a:fillRef idx="0">
+            <a:schemeClr val="accent1"/>
+          </a:fillRef>
+          <a:effectRef idx="0">
+            <a:schemeClr val="accent1"/>
+          </a:effectRef>
+          <a:fontRef idx="minor">
+            <a:schemeClr val="tx1"/>
+          </a:fontRef>
+        </p:style>
+      </p:cxnSp>
+      <p:sp>
+        <p:nvSpPr>
+          <p:cNvPr id="8" name="Flowchart: Data 7">
+            <a:extLst>
+              <a:ext uri="{FF2B5EF4-FFF2-40B4-BE49-F238E27FC236}">
+                <a16:creationId xmlns:a16="http://schemas.microsoft.com/office/drawing/2014/main" id="{AB2EC3E4-2D1E-437B-9074-9B2F97EE5027}"/>
+              </a:ext>
+            </a:extLst>
+          </p:cNvPr>
+          <p:cNvSpPr/>
+          <p:nvPr/>
+        </p:nvSpPr>
+        <p:spPr>
+          <a:xfrm>
+            <a:off x="796480" y="4673790"/>
+            <a:ext cx="1788224" cy="927481"/>
+          </a:xfrm>
+          <a:prstGeom prst="flowChartInputOutput">
+            <a:avLst/>
+          </a:prstGeom>
+        </p:spPr>
+        <p:style>
+          <a:lnRef idx="2">
+            <a:schemeClr val="accent1">
+              <a:shade val="50000"/>
+            </a:schemeClr>
+          </a:lnRef>
+          <a:fillRef idx="1">
+            <a:schemeClr val="accent1"/>
+          </a:fillRef>
+          <a:effectRef idx="0">
+            <a:schemeClr val="accent1"/>
+          </a:effectRef>
+          <a:fontRef idx="minor">
+            <a:schemeClr val="lt1"/>
+          </a:fontRef>
+        </p:style>
+        <p:txBody>
+          <a:bodyPr rtlCol="0" anchor="ctr"/>
+          <a:lstStyle/>
+          <a:p>
+            <a:pPr algn="ctr"/>
+            <a:endParaRPr lang="zh-CN" altLang="en-US"/>
+          </a:p>
+        </p:txBody>
+      </p:sp>
+      <p:sp>
+        <p:nvSpPr>
+          <p:cNvPr id="9" name="Freeform: Shape 8">
+            <a:extLst>
+              <a:ext uri="{FF2B5EF4-FFF2-40B4-BE49-F238E27FC236}">
+                <a16:creationId xmlns:a16="http://schemas.microsoft.com/office/drawing/2014/main" id="{00584882-8E05-43C4-8D7D-E673B88624C0}"/>
+              </a:ext>
+            </a:extLst>
+          </p:cNvPr>
+          <p:cNvSpPr/>
+          <p:nvPr/>
+        </p:nvSpPr>
+        <p:spPr>
+          <a:xfrm>
+            <a:off x="1340949" y="2588170"/>
+            <a:ext cx="1063947" cy="946118"/>
+          </a:xfrm>
+          <a:custGeom>
+            <a:avLst/>
+            <a:gdLst>
+              <a:gd name="connsiteX0" fmla="*/ 17981 w 868373"/>
+              <a:gd name="connsiteY0" fmla="*/ 36576 h 795528"/>
+              <a:gd name="connsiteX1" fmla="*/ 164285 w 868373"/>
+              <a:gd name="connsiteY1" fmla="*/ 18288 h 795528"/>
+              <a:gd name="connsiteX2" fmla="*/ 292301 w 868373"/>
+              <a:gd name="connsiteY2" fmla="*/ 0 h 795528"/>
+              <a:gd name="connsiteX3" fmla="*/ 420317 w 868373"/>
+              <a:gd name="connsiteY3" fmla="*/ 9144 h 795528"/>
+              <a:gd name="connsiteX4" fmla="*/ 475181 w 868373"/>
+              <a:gd name="connsiteY4" fmla="*/ 27432 h 795528"/>
+              <a:gd name="connsiteX5" fmla="*/ 520901 w 868373"/>
+              <a:gd name="connsiteY5" fmla="*/ 73152 h 795528"/>
+              <a:gd name="connsiteX6" fmla="*/ 594053 w 868373"/>
+              <a:gd name="connsiteY6" fmla="*/ 128016 h 795528"/>
+              <a:gd name="connsiteX7" fmla="*/ 639773 w 868373"/>
+              <a:gd name="connsiteY7" fmla="*/ 182880 h 795528"/>
+              <a:gd name="connsiteX8" fmla="*/ 658061 w 868373"/>
+              <a:gd name="connsiteY8" fmla="*/ 210312 h 795528"/>
+              <a:gd name="connsiteX9" fmla="*/ 685493 w 868373"/>
+              <a:gd name="connsiteY9" fmla="*/ 237744 h 795528"/>
+              <a:gd name="connsiteX10" fmla="*/ 740357 w 868373"/>
+              <a:gd name="connsiteY10" fmla="*/ 320040 h 795528"/>
+              <a:gd name="connsiteX11" fmla="*/ 758645 w 868373"/>
+              <a:gd name="connsiteY11" fmla="*/ 347472 h 795528"/>
+              <a:gd name="connsiteX12" fmla="*/ 776933 w 868373"/>
+              <a:gd name="connsiteY12" fmla="*/ 374904 h 795528"/>
+              <a:gd name="connsiteX13" fmla="*/ 804365 w 868373"/>
+              <a:gd name="connsiteY13" fmla="*/ 438912 h 795528"/>
+              <a:gd name="connsiteX14" fmla="*/ 840941 w 868373"/>
+              <a:gd name="connsiteY14" fmla="*/ 493776 h 795528"/>
+              <a:gd name="connsiteX15" fmla="*/ 859229 w 868373"/>
+              <a:gd name="connsiteY15" fmla="*/ 548640 h 795528"/>
+              <a:gd name="connsiteX16" fmla="*/ 868373 w 868373"/>
+              <a:gd name="connsiteY16" fmla="*/ 576072 h 795528"/>
+              <a:gd name="connsiteX17" fmla="*/ 859229 w 868373"/>
+              <a:gd name="connsiteY17" fmla="*/ 740664 h 795528"/>
+              <a:gd name="connsiteX18" fmla="*/ 831797 w 868373"/>
+              <a:gd name="connsiteY18" fmla="*/ 749808 h 795528"/>
+              <a:gd name="connsiteX19" fmla="*/ 749501 w 868373"/>
+              <a:gd name="connsiteY19" fmla="*/ 786384 h 795528"/>
+              <a:gd name="connsiteX20" fmla="*/ 722069 w 868373"/>
+              <a:gd name="connsiteY20" fmla="*/ 795528 h 795528"/>
+              <a:gd name="connsiteX21" fmla="*/ 511757 w 868373"/>
+              <a:gd name="connsiteY21" fmla="*/ 777240 h 795528"/>
+              <a:gd name="connsiteX22" fmla="*/ 466037 w 868373"/>
+              <a:gd name="connsiteY22" fmla="*/ 768096 h 795528"/>
+              <a:gd name="connsiteX23" fmla="*/ 356309 w 868373"/>
+              <a:gd name="connsiteY23" fmla="*/ 731520 h 795528"/>
+              <a:gd name="connsiteX24" fmla="*/ 310589 w 868373"/>
+              <a:gd name="connsiteY24" fmla="*/ 713232 h 795528"/>
+              <a:gd name="connsiteX25" fmla="*/ 191717 w 868373"/>
+              <a:gd name="connsiteY25" fmla="*/ 612648 h 795528"/>
+              <a:gd name="connsiteX26" fmla="*/ 145997 w 868373"/>
+              <a:gd name="connsiteY26" fmla="*/ 557784 h 795528"/>
+              <a:gd name="connsiteX27" fmla="*/ 91133 w 868373"/>
+              <a:gd name="connsiteY27" fmla="*/ 466344 h 795528"/>
+              <a:gd name="connsiteX28" fmla="*/ 63701 w 868373"/>
+              <a:gd name="connsiteY28" fmla="*/ 365760 h 795528"/>
+              <a:gd name="connsiteX29" fmla="*/ 17981 w 868373"/>
+              <a:gd name="connsiteY29" fmla="*/ 237744 h 795528"/>
+              <a:gd name="connsiteX30" fmla="*/ 8837 w 868373"/>
+              <a:gd name="connsiteY30" fmla="*/ 164592 h 795528"/>
+              <a:gd name="connsiteX31" fmla="*/ 17981 w 868373"/>
+              <a:gd name="connsiteY31" fmla="*/ 36576 h 795528"/>
+            </a:gdLst>
+            <a:ahLst/>
+            <a:cxnLst>
+              <a:cxn ang="0">
+                <a:pos x="connsiteX0" y="connsiteY0"/>
+              </a:cxn>
+              <a:cxn ang="0">
+                <a:pos x="connsiteX1" y="connsiteY1"/>
+              </a:cxn>
+              <a:cxn ang="0">
+                <a:pos x="connsiteX2" y="connsiteY2"/>
+              </a:cxn>
+              <a:cxn ang="0">
+                <a:pos x="connsiteX3" y="connsiteY3"/>
+              </a:cxn>
+              <a:cxn ang="0">
+                <a:pos x="connsiteX4" y="connsiteY4"/>
+              </a:cxn>
+              <a:cxn ang="0">
+                <a:pos x="connsiteX5" y="connsiteY5"/>
+              </a:cxn>
+              <a:cxn ang="0">
+                <a:pos x="connsiteX6" y="connsiteY6"/>
+              </a:cxn>
+              <a:cxn ang="0">
+                <a:pos x="connsiteX7" y="connsiteY7"/>
+              </a:cxn>
+              <a:cxn ang="0">
+                <a:pos x="connsiteX8" y="connsiteY8"/>
+              </a:cxn>
+              <a:cxn ang="0">
+                <a:pos x="connsiteX9" y="connsiteY9"/>
+              </a:cxn>
+              <a:cxn ang="0">
+                <a:pos x="connsiteX10" y="connsiteY10"/>
+              </a:cxn>
+              <a:cxn ang="0">
+                <a:pos x="connsiteX11" y="connsiteY11"/>
+              </a:cxn>
+              <a:cxn ang="0">
+                <a:pos x="connsiteX12" y="connsiteY12"/>
+              </a:cxn>
+              <a:cxn ang="0">
+                <a:pos x="connsiteX13" y="connsiteY13"/>
+              </a:cxn>
+              <a:cxn ang="0">
+                <a:pos x="connsiteX14" y="connsiteY14"/>
+              </a:cxn>
+              <a:cxn ang="0">
+                <a:pos x="connsiteX15" y="connsiteY15"/>
+              </a:cxn>
+              <a:cxn ang="0">
+                <a:pos x="connsiteX16" y="connsiteY16"/>
+              </a:cxn>
+              <a:cxn ang="0">
+                <a:pos x="connsiteX17" y="connsiteY17"/>
+              </a:cxn>
+              <a:cxn ang="0">
+                <a:pos x="connsiteX18" y="connsiteY18"/>
+              </a:cxn>
+              <a:cxn ang="0">
+                <a:pos x="connsiteX19" y="connsiteY19"/>
+              </a:cxn>
+              <a:cxn ang="0">
+                <a:pos x="connsiteX20" y="connsiteY20"/>
+              </a:cxn>
+              <a:cxn ang="0">
+                <a:pos x="connsiteX21" y="connsiteY21"/>
+              </a:cxn>
+              <a:cxn ang="0">
+                <a:pos x="connsiteX22" y="connsiteY22"/>
+              </a:cxn>
+              <a:cxn ang="0">
+                <a:pos x="connsiteX23" y="connsiteY23"/>
+              </a:cxn>
+              <a:cxn ang="0">
+                <a:pos x="connsiteX24" y="connsiteY24"/>
+              </a:cxn>
+              <a:cxn ang="0">
+                <a:pos x="connsiteX25" y="connsiteY25"/>
+              </a:cxn>
+              <a:cxn ang="0">
+                <a:pos x="connsiteX26" y="connsiteY26"/>
+              </a:cxn>
+              <a:cxn ang="0">
+                <a:pos x="connsiteX27" y="connsiteY27"/>
+              </a:cxn>
+              <a:cxn ang="0">
+                <a:pos x="connsiteX28" y="connsiteY28"/>
+              </a:cxn>
+              <a:cxn ang="0">
+                <a:pos x="connsiteX29" y="connsiteY29"/>
+              </a:cxn>
+              <a:cxn ang="0">
+                <a:pos x="connsiteX30" y="connsiteY30"/>
+              </a:cxn>
+              <a:cxn ang="0">
+                <a:pos x="connsiteX31" y="connsiteY31"/>
+              </a:cxn>
+            </a:cxnLst>
+            <a:rect l="l" t="t" r="r" b="b"/>
+            <a:pathLst>
+              <a:path w="868373" h="795528">
+                <a:moveTo>
+                  <a:pt x="17981" y="36576"/>
+                </a:moveTo>
+                <a:cubicBezTo>
+                  <a:pt x="43889" y="12192"/>
+                  <a:pt x="30638" y="32356"/>
+                  <a:pt x="164285" y="18288"/>
+                </a:cubicBezTo>
+                <a:cubicBezTo>
+                  <a:pt x="226408" y="11749"/>
+                  <a:pt x="235399" y="9484"/>
+                  <a:pt x="292301" y="0"/>
+                </a:cubicBezTo>
+                <a:cubicBezTo>
+                  <a:pt x="334973" y="3048"/>
+                  <a:pt x="378010" y="2798"/>
+                  <a:pt x="420317" y="9144"/>
+                </a:cubicBezTo>
+                <a:cubicBezTo>
+                  <a:pt x="439381" y="12004"/>
+                  <a:pt x="475181" y="27432"/>
+                  <a:pt x="475181" y="27432"/>
+                </a:cubicBezTo>
+                <a:cubicBezTo>
+                  <a:pt x="502434" y="68311"/>
+                  <a:pt x="481456" y="44465"/>
+                  <a:pt x="520901" y="73152"/>
+                </a:cubicBezTo>
+                <a:cubicBezTo>
+                  <a:pt x="545551" y="91079"/>
+                  <a:pt x="594053" y="128016"/>
+                  <a:pt x="594053" y="128016"/>
+                </a:cubicBezTo>
+                <a:cubicBezTo>
+                  <a:pt x="611517" y="180409"/>
+                  <a:pt x="589950" y="133057"/>
+                  <a:pt x="639773" y="182880"/>
+                </a:cubicBezTo>
+                <a:cubicBezTo>
+                  <a:pt x="647544" y="190651"/>
+                  <a:pt x="651026" y="201869"/>
+                  <a:pt x="658061" y="210312"/>
+                </a:cubicBezTo>
+                <a:cubicBezTo>
+                  <a:pt x="666340" y="220246"/>
+                  <a:pt x="677554" y="227536"/>
+                  <a:pt x="685493" y="237744"/>
+                </a:cubicBezTo>
+                <a:lnTo>
+                  <a:pt x="740357" y="320040"/>
+                </a:lnTo>
+                <a:lnTo>
+                  <a:pt x="758645" y="347472"/>
+                </a:lnTo>
+                <a:cubicBezTo>
+                  <a:pt x="764741" y="356616"/>
+                  <a:pt x="773458" y="364478"/>
+                  <a:pt x="776933" y="374904"/>
+                </a:cubicBezTo>
+                <a:cubicBezTo>
+                  <a:pt x="786393" y="403283"/>
+                  <a:pt x="787416" y="410664"/>
+                  <a:pt x="804365" y="438912"/>
+                </a:cubicBezTo>
+                <a:cubicBezTo>
+                  <a:pt x="815673" y="457759"/>
+                  <a:pt x="833990" y="472924"/>
+                  <a:pt x="840941" y="493776"/>
+                </a:cubicBezTo>
+                <a:lnTo>
+                  <a:pt x="859229" y="548640"/>
+                </a:lnTo>
+                <a:lnTo>
+                  <a:pt x="868373" y="576072"/>
+                </a:lnTo>
+                <a:cubicBezTo>
+                  <a:pt x="865325" y="630936"/>
+                  <a:pt x="870549" y="686894"/>
+                  <a:pt x="859229" y="740664"/>
+                </a:cubicBezTo>
+                <a:cubicBezTo>
+                  <a:pt x="857243" y="750096"/>
+                  <a:pt x="840418" y="745497"/>
+                  <a:pt x="831797" y="749808"/>
+                </a:cubicBezTo>
+                <a:cubicBezTo>
+                  <a:pt x="744854" y="793280"/>
+                  <a:pt x="891045" y="739203"/>
+                  <a:pt x="749501" y="786384"/>
+                </a:cubicBezTo>
+                <a:lnTo>
+                  <a:pt x="722069" y="795528"/>
+                </a:lnTo>
+                <a:cubicBezTo>
+                  <a:pt x="633576" y="789628"/>
+                  <a:pt x="591127" y="789451"/>
+                  <a:pt x="511757" y="777240"/>
+                </a:cubicBezTo>
+                <a:cubicBezTo>
+                  <a:pt x="496396" y="774877"/>
+                  <a:pt x="480947" y="772481"/>
+                  <a:pt x="466037" y="768096"/>
+                </a:cubicBezTo>
+                <a:cubicBezTo>
+                  <a:pt x="429049" y="757217"/>
+                  <a:pt x="392106" y="745839"/>
+                  <a:pt x="356309" y="731520"/>
+                </a:cubicBezTo>
+                <a:cubicBezTo>
+                  <a:pt x="341069" y="725424"/>
+                  <a:pt x="324396" y="722108"/>
+                  <a:pt x="310589" y="713232"/>
+                </a:cubicBezTo>
+                <a:cubicBezTo>
+                  <a:pt x="271563" y="688144"/>
+                  <a:pt x="224646" y="649236"/>
+                  <a:pt x="191717" y="612648"/>
+                </a:cubicBezTo>
+                <a:cubicBezTo>
+                  <a:pt x="175792" y="594953"/>
+                  <a:pt x="159484" y="577401"/>
+                  <a:pt x="145997" y="557784"/>
+                </a:cubicBezTo>
+                <a:cubicBezTo>
+                  <a:pt x="125859" y="528493"/>
+                  <a:pt x="91133" y="466344"/>
+                  <a:pt x="91133" y="466344"/>
+                </a:cubicBezTo>
+                <a:cubicBezTo>
+                  <a:pt x="74551" y="366855"/>
+                  <a:pt x="93070" y="453868"/>
+                  <a:pt x="63701" y="365760"/>
+                </a:cubicBezTo>
+                <a:cubicBezTo>
+                  <a:pt x="20537" y="236268"/>
+                  <a:pt x="73506" y="367302"/>
+                  <a:pt x="17981" y="237744"/>
+                </a:cubicBezTo>
+                <a:cubicBezTo>
+                  <a:pt x="14933" y="213360"/>
+                  <a:pt x="11708" y="188997"/>
+                  <a:pt x="8837" y="164592"/>
+                </a:cubicBezTo>
+                <a:cubicBezTo>
+                  <a:pt x="-980" y="81146"/>
+                  <a:pt x="-7927" y="60960"/>
+                  <a:pt x="17981" y="36576"/>
+                </a:cubicBezTo>
+                <a:close/>
+              </a:path>
+            </a:pathLst>
+          </a:custGeom>
+          <a:solidFill>
+            <a:srgbClr val="FFFFFF"/>
+          </a:solidFill>
+        </p:spPr>
+        <p:style>
+          <a:lnRef idx="2">
+            <a:schemeClr val="accent1">
+              <a:shade val="50000"/>
+            </a:schemeClr>
+          </a:lnRef>
+          <a:fillRef idx="1">
+            <a:schemeClr val="accent1"/>
+          </a:fillRef>
+          <a:effectRef idx="0">
+            <a:schemeClr val="accent1"/>
+          </a:effectRef>
+          <a:fontRef idx="minor">
+            <a:schemeClr val="lt1"/>
+          </a:fontRef>
+        </p:style>
+        <p:txBody>
+          <a:bodyPr rtlCol="0" anchor="ctr"/>
+          <a:lstStyle/>
+          <a:p>
+            <a:pPr algn="ctr"/>
+            <a:endParaRPr lang="zh-CN" altLang="en-US"/>
+          </a:p>
+        </p:txBody>
+      </p:sp>
+      <p:cxnSp>
+        <p:nvCxnSpPr>
+          <p:cNvPr id="15" name="Straight Arrow Connector 14">
+            <a:extLst>
+              <a:ext uri="{FF2B5EF4-FFF2-40B4-BE49-F238E27FC236}">
+                <a16:creationId xmlns:a16="http://schemas.microsoft.com/office/drawing/2014/main" id="{9052CBF4-6F3A-4CA5-BDF8-A6862636A402}"/>
+              </a:ext>
+            </a:extLst>
+          </p:cNvPr>
+          <p:cNvCxnSpPr>
+            <a:cxnSpLocks/>
+          </p:cNvCxnSpPr>
+          <p:nvPr/>
+        </p:nvCxnSpPr>
+        <p:spPr>
+          <a:xfrm flipV="1">
+            <a:off x="4102100" y="5270500"/>
+            <a:ext cx="4940300" cy="558800"/>
+          </a:xfrm>
+          <a:prstGeom prst="bentConnector3">
+            <a:avLst>
+              <a:gd name="adj1" fmla="val 50000"/>
+            </a:avLst>
+          </a:prstGeom>
+          <a:ln w="92075" cap="sq" cmpd="dbl">
+            <a:prstDash val="solid"/>
+            <a:round/>
+            <a:headEnd type="none"/>
+            <a:tailEnd type="triangle" w="med" len="lg"/>
+          </a:ln>
+        </p:spPr>
+        <p:style>
+          <a:lnRef idx="1">
+            <a:schemeClr val="accent1"/>
+          </a:lnRef>
+          <a:fillRef idx="0">
+            <a:schemeClr val="accent1"/>
+          </a:fillRef>
+          <a:effectRef idx="0">
+            <a:schemeClr val="accent1"/>
+          </a:effectRef>
+          <a:fontRef idx="minor">
+            <a:schemeClr val="tx1"/>
+          </a:fontRef>
+        </p:style>
+      </p:cxnSp>
+    </p:spTree>
+    <p:extLst>
+      <p:ext uri="{BB962C8B-B14F-4D97-AF65-F5344CB8AC3E}">
+        <p14:creationId xmlns:p14="http://schemas.microsoft.com/office/powerpoint/2010/main" val="2235589275"/>
       </p:ext>
     </p:extLst>
   </p:cSld>

</xml_diff>